<commit_message>
VIEWERJAVA-2453 - Update product Public Docs
</commit_message>
<xml_diff>
--- a/Examples/resources/sample_files/with_missing_font.pptx
+++ b/Examples/resources/sample_files/with_missing_font.pptx
@@ -1,114 +1,19 @@
 
 <file path=ppt/presentation.xml><?xml version="1.0" encoding="utf-8"?>
-<p:presentation xmlns:a="http://schemas.openxmlformats.org/drawingml/2006/main" xmlns:r="http://schemas.openxmlformats.org/officeDocument/2006/relationships" xmlns:p="http://schemas.openxmlformats.org/presentationml/2006/main">
+<p:presentation xmlns:a="http://schemas.openxmlformats.org/drawingml/2006/main" xmlns:p="http://schemas.openxmlformats.org/presentationml/2006/main" xmlns:r="http://schemas.openxmlformats.org/officeDocument/2006/relationships" xmlns:p14="http://schemas.microsoft.com/office/powerpoint/2010/main" xmlns:p15="http://schemas.microsoft.com/office/powerpoint/2012/main" xmlns:mc="http://schemas.openxmlformats.org/markup-compatibility/2006">
   <p:sldMasterIdLst>
-    <p:sldMasterId id="2147483648" r:id="rId1"/>
+    <p:sldMasterId id="2147483648" r:id="rId2"/>
   </p:sldMasterIdLst>
   <p:sldIdLst>
-    <p:sldId id="256" r:id="rId2"/>
+    <p:sldId id="256" r:id="rId3"/>
   </p:sldIdLst>
   <p:sldSz cx="12192000" cy="6858000"/>
   <p:notesSz cx="7772400" cy="10058400"/>
-  <p:defaultTextStyle>
-    <a:defPPr>
-      <a:defRPr lang="en-US"/>
-    </a:defPPr>
-    <a:lvl1pPr marL="0" algn="l" defTabSz="914400" rtl="0" eaLnBrk="1" latinLnBrk="0" hangingPunct="1">
-      <a:defRPr sz="1800" kern="1200">
-        <a:solidFill>
-          <a:schemeClr val="tx1"/>
-        </a:solidFill>
-        <a:latin typeface="+mn-lt"/>
-        <a:ea typeface="+mn-ea"/>
-        <a:cs typeface="+mn-cs"/>
-      </a:defRPr>
-    </a:lvl1pPr>
-    <a:lvl2pPr marL="457200" algn="l" defTabSz="914400" rtl="0" eaLnBrk="1" latinLnBrk="0" hangingPunct="1">
-      <a:defRPr sz="1800" kern="1200">
-        <a:solidFill>
-          <a:schemeClr val="tx1"/>
-        </a:solidFill>
-        <a:latin typeface="+mn-lt"/>
-        <a:ea typeface="+mn-ea"/>
-        <a:cs typeface="+mn-cs"/>
-      </a:defRPr>
-    </a:lvl2pPr>
-    <a:lvl3pPr marL="914400" algn="l" defTabSz="914400" rtl="0" eaLnBrk="1" latinLnBrk="0" hangingPunct="1">
-      <a:defRPr sz="1800" kern="1200">
-        <a:solidFill>
-          <a:schemeClr val="tx1"/>
-        </a:solidFill>
-        <a:latin typeface="+mn-lt"/>
-        <a:ea typeface="+mn-ea"/>
-        <a:cs typeface="+mn-cs"/>
-      </a:defRPr>
-    </a:lvl3pPr>
-    <a:lvl4pPr marL="1371600" algn="l" defTabSz="914400" rtl="0" eaLnBrk="1" latinLnBrk="0" hangingPunct="1">
-      <a:defRPr sz="1800" kern="1200">
-        <a:solidFill>
-          <a:schemeClr val="tx1"/>
-        </a:solidFill>
-        <a:latin typeface="+mn-lt"/>
-        <a:ea typeface="+mn-ea"/>
-        <a:cs typeface="+mn-cs"/>
-      </a:defRPr>
-    </a:lvl4pPr>
-    <a:lvl5pPr marL="1828800" algn="l" defTabSz="914400" rtl="0" eaLnBrk="1" latinLnBrk="0" hangingPunct="1">
-      <a:defRPr sz="1800" kern="1200">
-        <a:solidFill>
-          <a:schemeClr val="tx1"/>
-        </a:solidFill>
-        <a:latin typeface="+mn-lt"/>
-        <a:ea typeface="+mn-ea"/>
-        <a:cs typeface="+mn-cs"/>
-      </a:defRPr>
-    </a:lvl5pPr>
-    <a:lvl6pPr marL="2286000" algn="l" defTabSz="914400" rtl="0" eaLnBrk="1" latinLnBrk="0" hangingPunct="1">
-      <a:defRPr sz="1800" kern="1200">
-        <a:solidFill>
-          <a:schemeClr val="tx1"/>
-        </a:solidFill>
-        <a:latin typeface="+mn-lt"/>
-        <a:ea typeface="+mn-ea"/>
-        <a:cs typeface="+mn-cs"/>
-      </a:defRPr>
-    </a:lvl6pPr>
-    <a:lvl7pPr marL="2743200" algn="l" defTabSz="914400" rtl="0" eaLnBrk="1" latinLnBrk="0" hangingPunct="1">
-      <a:defRPr sz="1800" kern="1200">
-        <a:solidFill>
-          <a:schemeClr val="tx1"/>
-        </a:solidFill>
-        <a:latin typeface="+mn-lt"/>
-        <a:ea typeface="+mn-ea"/>
-        <a:cs typeface="+mn-cs"/>
-      </a:defRPr>
-    </a:lvl7pPr>
-    <a:lvl8pPr marL="3200400" algn="l" defTabSz="914400" rtl="0" eaLnBrk="1" latinLnBrk="0" hangingPunct="1">
-      <a:defRPr sz="1800" kern="1200">
-        <a:solidFill>
-          <a:schemeClr val="tx1"/>
-        </a:solidFill>
-        <a:latin typeface="+mn-lt"/>
-        <a:ea typeface="+mn-ea"/>
-        <a:cs typeface="+mn-cs"/>
-      </a:defRPr>
-    </a:lvl8pPr>
-    <a:lvl9pPr marL="3657600" algn="l" defTabSz="914400" rtl="0" eaLnBrk="1" latinLnBrk="0" hangingPunct="1">
-      <a:defRPr sz="1800" kern="1200">
-        <a:solidFill>
-          <a:schemeClr val="tx1"/>
-        </a:solidFill>
-        <a:latin typeface="+mn-lt"/>
-        <a:ea typeface="+mn-ea"/>
-        <a:cs typeface="+mn-cs"/>
-      </a:defRPr>
-    </a:lvl9pPr>
-  </p:defaultTextStyle>
 </p:presentation>
 </file>
 
 <file path=ppt/slideLayouts/slideLayout1.xml><?xml version="1.0" encoding="utf-8"?>
-<p:sldLayout xmlns:a="http://schemas.openxmlformats.org/drawingml/2006/main" xmlns:r="http://schemas.openxmlformats.org/officeDocument/2006/relationships" xmlns:p="http://schemas.openxmlformats.org/presentationml/2006/main" type="blank" preserve="1">
+<p:sldLayout xmlns:a="http://schemas.openxmlformats.org/drawingml/2006/main" xmlns:p="http://schemas.openxmlformats.org/presentationml/2006/main" xmlns:r="http://schemas.openxmlformats.org/officeDocument/2006/relationships" xmlns:p14="http://schemas.microsoft.com/office/powerpoint/2010/main" xmlns:p15="http://schemas.microsoft.com/office/powerpoint/2012/main" xmlns:mc="http://schemas.openxmlformats.org/markup-compatibility/2006" type="blank" preserve="1">
   <p:cSld name="Blank Slide">
     <p:spTree>
       <p:nvGrpSpPr>
@@ -126,14 +31,11 @@
       </p:grpSpPr>
     </p:spTree>
   </p:cSld>
-  <p:clrMapOvr>
-    <a:masterClrMapping/>
-  </p:clrMapOvr>
 </p:sldLayout>
 </file>
 
 <file path=ppt/slideLayouts/slideLayout10.xml><?xml version="1.0" encoding="utf-8"?>
-<p:sldLayout xmlns:a="http://schemas.openxmlformats.org/drawingml/2006/main" xmlns:r="http://schemas.openxmlformats.org/officeDocument/2006/relationships" xmlns:p="http://schemas.openxmlformats.org/presentationml/2006/main" type="objOverTx" preserve="1">
+<p:sldLayout xmlns:a="http://schemas.openxmlformats.org/drawingml/2006/main" xmlns:p="http://schemas.openxmlformats.org/presentationml/2006/main" xmlns:r="http://schemas.openxmlformats.org/officeDocument/2006/relationships" xmlns:p14="http://schemas.microsoft.com/office/powerpoint/2010/main" xmlns:p15="http://schemas.microsoft.com/office/powerpoint/2012/main" xmlns:mc="http://schemas.openxmlformats.org/markup-compatibility/2006" type="objOverTx" preserve="1">
   <p:cSld name="Title, Content over Content">
     <p:spTree>
       <p:nvGrpSpPr>
@@ -169,12 +71,11 @@
           </a:prstGeom>
         </p:spPr>
         <p:txBody>
-          <a:bodyPr lIns="0" tIns="0" rIns="0" bIns="0" anchor="ctr">
+          <a:bodyPr lIns="0" rIns="0" tIns="0" bIns="0" anchor="ctr">
             <a:spAutoFit/>
           </a:bodyPr>
-          <a:lstStyle/>
-          <a:p>
-            <a:endParaRPr lang="en-US" sz="1800" b="0" strike="noStrike" spc="-1">
+          <a:p>
+            <a:endParaRPr b="0" lang="en-US" sz="1800" spc="-1" strike="noStrike">
               <a:solidFill>
                 <a:srgbClr val="000000"/>
               </a:solidFill>
@@ -203,12 +104,11 @@
           </a:prstGeom>
         </p:spPr>
         <p:txBody>
-          <a:bodyPr lIns="0" tIns="0" rIns="0" bIns="0">
-            <a:normAutofit/>
-          </a:bodyPr>
-          <a:lstStyle/>
-          <a:p>
-            <a:endParaRPr lang="en-US" sz="2800" b="0" strike="noStrike" spc="-1">
+          <a:bodyPr lIns="0" rIns="0" tIns="0" bIns="0">
+            <a:normAutofit/>
+          </a:bodyPr>
+          <a:p>
+            <a:endParaRPr b="0" lang="en-US" sz="2800" spc="-1" strike="noStrike">
               <a:solidFill>
                 <a:srgbClr val="000000"/>
               </a:solidFill>
@@ -237,12 +137,11 @@
           </a:prstGeom>
         </p:spPr>
         <p:txBody>
-          <a:bodyPr lIns="0" tIns="0" rIns="0" bIns="0">
-            <a:normAutofit/>
-          </a:bodyPr>
-          <a:lstStyle/>
-          <a:p>
-            <a:endParaRPr lang="en-US" sz="2800" b="0" strike="noStrike" spc="-1">
+          <a:bodyPr lIns="0" rIns="0" tIns="0" bIns="0">
+            <a:normAutofit/>
+          </a:bodyPr>
+          <a:p>
+            <a:endParaRPr b="0" lang="en-US" sz="2800" spc="-1" strike="noStrike">
               <a:solidFill>
                 <a:srgbClr val="000000"/>
               </a:solidFill>
@@ -253,14 +152,11 @@
       </p:sp>
     </p:spTree>
   </p:cSld>
-  <p:clrMapOvr>
-    <a:masterClrMapping/>
-  </p:clrMapOvr>
 </p:sldLayout>
 </file>
 
 <file path=ppt/slideLayouts/slideLayout11.xml><?xml version="1.0" encoding="utf-8"?>
-<p:sldLayout xmlns:a="http://schemas.openxmlformats.org/drawingml/2006/main" xmlns:r="http://schemas.openxmlformats.org/officeDocument/2006/relationships" xmlns:p="http://schemas.openxmlformats.org/presentationml/2006/main" type="fourObj" preserve="1">
+<p:sldLayout xmlns:a="http://schemas.openxmlformats.org/drawingml/2006/main" xmlns:p="http://schemas.openxmlformats.org/presentationml/2006/main" xmlns:r="http://schemas.openxmlformats.org/officeDocument/2006/relationships" xmlns:p14="http://schemas.microsoft.com/office/powerpoint/2010/main" xmlns:p15="http://schemas.microsoft.com/office/powerpoint/2012/main" xmlns:mc="http://schemas.openxmlformats.org/markup-compatibility/2006" type="fourObj" preserve="1">
   <p:cSld name="Title, 4 Content">
     <p:spTree>
       <p:nvGrpSpPr>
@@ -296,12 +192,11 @@
           </a:prstGeom>
         </p:spPr>
         <p:txBody>
-          <a:bodyPr lIns="0" tIns="0" rIns="0" bIns="0" anchor="ctr">
+          <a:bodyPr lIns="0" rIns="0" tIns="0" bIns="0" anchor="ctr">
             <a:spAutoFit/>
           </a:bodyPr>
-          <a:lstStyle/>
-          <a:p>
-            <a:endParaRPr lang="en-US" sz="1800" b="0" strike="noStrike" spc="-1">
+          <a:p>
+            <a:endParaRPr b="0" lang="en-US" sz="1800" spc="-1" strike="noStrike">
               <a:solidFill>
                 <a:srgbClr val="000000"/>
               </a:solidFill>
@@ -330,12 +225,11 @@
           </a:prstGeom>
         </p:spPr>
         <p:txBody>
-          <a:bodyPr lIns="0" tIns="0" rIns="0" bIns="0">
-            <a:normAutofit/>
-          </a:bodyPr>
-          <a:lstStyle/>
-          <a:p>
-            <a:endParaRPr lang="en-US" sz="2800" b="0" strike="noStrike" spc="-1">
+          <a:bodyPr lIns="0" rIns="0" tIns="0" bIns="0">
+            <a:normAutofit/>
+          </a:bodyPr>
+          <a:p>
+            <a:endParaRPr b="0" lang="en-US" sz="2800" spc="-1" strike="noStrike">
               <a:solidFill>
                 <a:srgbClr val="000000"/>
               </a:solidFill>
@@ -364,12 +258,11 @@
           </a:prstGeom>
         </p:spPr>
         <p:txBody>
-          <a:bodyPr lIns="0" tIns="0" rIns="0" bIns="0">
-            <a:normAutofit/>
-          </a:bodyPr>
-          <a:lstStyle/>
-          <a:p>
-            <a:endParaRPr lang="en-US" sz="2800" b="0" strike="noStrike" spc="-1">
+          <a:bodyPr lIns="0" rIns="0" tIns="0" bIns="0">
+            <a:normAutofit/>
+          </a:bodyPr>
+          <a:p>
+            <a:endParaRPr b="0" lang="en-US" sz="2800" spc="-1" strike="noStrike">
               <a:solidFill>
                 <a:srgbClr val="000000"/>
               </a:solidFill>
@@ -398,12 +291,11 @@
           </a:prstGeom>
         </p:spPr>
         <p:txBody>
-          <a:bodyPr lIns="0" tIns="0" rIns="0" bIns="0">
-            <a:normAutofit/>
-          </a:bodyPr>
-          <a:lstStyle/>
-          <a:p>
-            <a:endParaRPr lang="en-US" sz="2800" b="0" strike="noStrike" spc="-1">
+          <a:bodyPr lIns="0" rIns="0" tIns="0" bIns="0">
+            <a:normAutofit/>
+          </a:bodyPr>
+          <a:p>
+            <a:endParaRPr b="0" lang="en-US" sz="2800" spc="-1" strike="noStrike">
               <a:solidFill>
                 <a:srgbClr val="000000"/>
               </a:solidFill>
@@ -432,12 +324,11 @@
           </a:prstGeom>
         </p:spPr>
         <p:txBody>
-          <a:bodyPr lIns="0" tIns="0" rIns="0" bIns="0">
-            <a:normAutofit/>
-          </a:bodyPr>
-          <a:lstStyle/>
-          <a:p>
-            <a:endParaRPr lang="en-US" sz="2800" b="0" strike="noStrike" spc="-1">
+          <a:bodyPr lIns="0" rIns="0" tIns="0" bIns="0">
+            <a:normAutofit/>
+          </a:bodyPr>
+          <a:p>
+            <a:endParaRPr b="0" lang="en-US" sz="2800" spc="-1" strike="noStrike">
               <a:solidFill>
                 <a:srgbClr val="000000"/>
               </a:solidFill>
@@ -448,14 +339,11 @@
       </p:sp>
     </p:spTree>
   </p:cSld>
-  <p:clrMapOvr>
-    <a:masterClrMapping/>
-  </p:clrMapOvr>
 </p:sldLayout>
 </file>
 
 <file path=ppt/slideLayouts/slideLayout12.xml><?xml version="1.0" encoding="utf-8"?>
-<p:sldLayout xmlns:a="http://schemas.openxmlformats.org/drawingml/2006/main" xmlns:r="http://schemas.openxmlformats.org/officeDocument/2006/relationships" xmlns:p="http://schemas.openxmlformats.org/presentationml/2006/main" type="blank" preserve="1">
+<p:sldLayout xmlns:a="http://schemas.openxmlformats.org/drawingml/2006/main" xmlns:p="http://schemas.openxmlformats.org/presentationml/2006/main" xmlns:r="http://schemas.openxmlformats.org/officeDocument/2006/relationships" xmlns:p14="http://schemas.microsoft.com/office/powerpoint/2010/main" xmlns:p15="http://schemas.microsoft.com/office/powerpoint/2012/main" xmlns:mc="http://schemas.openxmlformats.org/markup-compatibility/2006" type="blank" preserve="1">
   <p:cSld name="Title, 6 Content">
     <p:spTree>
       <p:nvGrpSpPr>
@@ -491,12 +379,11 @@
           </a:prstGeom>
         </p:spPr>
         <p:txBody>
-          <a:bodyPr lIns="0" tIns="0" rIns="0" bIns="0" anchor="ctr">
+          <a:bodyPr lIns="0" rIns="0" tIns="0" bIns="0" anchor="ctr">
             <a:spAutoFit/>
           </a:bodyPr>
-          <a:lstStyle/>
-          <a:p>
-            <a:endParaRPr lang="en-US" sz="1800" b="0" strike="noStrike" spc="-1">
+          <a:p>
+            <a:endParaRPr b="0" lang="en-US" sz="1800" spc="-1" strike="noStrike">
               <a:solidFill>
                 <a:srgbClr val="000000"/>
               </a:solidFill>
@@ -525,12 +412,11 @@
           </a:prstGeom>
         </p:spPr>
         <p:txBody>
-          <a:bodyPr lIns="0" tIns="0" rIns="0" bIns="0">
-            <a:normAutofit/>
-          </a:bodyPr>
-          <a:lstStyle/>
-          <a:p>
-            <a:endParaRPr lang="en-US" sz="2800" b="0" strike="noStrike" spc="-1">
+          <a:bodyPr lIns="0" rIns="0" tIns="0" bIns="0">
+            <a:normAutofit/>
+          </a:bodyPr>
+          <a:p>
+            <a:endParaRPr b="0" lang="en-US" sz="2800" spc="-1" strike="noStrike">
               <a:solidFill>
                 <a:srgbClr val="000000"/>
               </a:solidFill>
@@ -559,12 +445,11 @@
           </a:prstGeom>
         </p:spPr>
         <p:txBody>
-          <a:bodyPr lIns="0" tIns="0" rIns="0" bIns="0">
-            <a:normAutofit/>
-          </a:bodyPr>
-          <a:lstStyle/>
-          <a:p>
-            <a:endParaRPr lang="en-US" sz="2800" b="0" strike="noStrike" spc="-1">
+          <a:bodyPr lIns="0" rIns="0" tIns="0" bIns="0">
+            <a:normAutofit/>
+          </a:bodyPr>
+          <a:p>
+            <a:endParaRPr b="0" lang="en-US" sz="2800" spc="-1" strike="noStrike">
               <a:solidFill>
                 <a:srgbClr val="000000"/>
               </a:solidFill>
@@ -593,12 +478,11 @@
           </a:prstGeom>
         </p:spPr>
         <p:txBody>
-          <a:bodyPr lIns="0" tIns="0" rIns="0" bIns="0">
-            <a:normAutofit/>
-          </a:bodyPr>
-          <a:lstStyle/>
-          <a:p>
-            <a:endParaRPr lang="en-US" sz="2800" b="0" strike="noStrike" spc="-1">
+          <a:bodyPr lIns="0" rIns="0" tIns="0" bIns="0">
+            <a:normAutofit/>
+          </a:bodyPr>
+          <a:p>
+            <a:endParaRPr b="0" lang="en-US" sz="2800" spc="-1" strike="noStrike">
               <a:solidFill>
                 <a:srgbClr val="000000"/>
               </a:solidFill>
@@ -627,12 +511,11 @@
           </a:prstGeom>
         </p:spPr>
         <p:txBody>
-          <a:bodyPr lIns="0" tIns="0" rIns="0" bIns="0">
-            <a:normAutofit/>
-          </a:bodyPr>
-          <a:lstStyle/>
-          <a:p>
-            <a:endParaRPr lang="en-US" sz="2800" b="0" strike="noStrike" spc="-1">
+          <a:bodyPr lIns="0" rIns="0" tIns="0" bIns="0">
+            <a:normAutofit/>
+          </a:bodyPr>
+          <a:p>
+            <a:endParaRPr b="0" lang="en-US" sz="2800" spc="-1" strike="noStrike">
               <a:solidFill>
                 <a:srgbClr val="000000"/>
               </a:solidFill>
@@ -661,12 +544,11 @@
           </a:prstGeom>
         </p:spPr>
         <p:txBody>
-          <a:bodyPr lIns="0" tIns="0" rIns="0" bIns="0">
-            <a:normAutofit/>
-          </a:bodyPr>
-          <a:lstStyle/>
-          <a:p>
-            <a:endParaRPr lang="en-US" sz="2800" b="0" strike="noStrike" spc="-1">
+          <a:bodyPr lIns="0" rIns="0" tIns="0" bIns="0">
+            <a:normAutofit/>
+          </a:bodyPr>
+          <a:p>
+            <a:endParaRPr b="0" lang="en-US" sz="2800" spc="-1" strike="noStrike">
               <a:solidFill>
                 <a:srgbClr val="000000"/>
               </a:solidFill>
@@ -695,12 +577,11 @@
           </a:prstGeom>
         </p:spPr>
         <p:txBody>
-          <a:bodyPr lIns="0" tIns="0" rIns="0" bIns="0">
-            <a:normAutofit/>
-          </a:bodyPr>
-          <a:lstStyle/>
-          <a:p>
-            <a:endParaRPr lang="en-US" sz="2800" b="0" strike="noStrike" spc="-1">
+          <a:bodyPr lIns="0" rIns="0" tIns="0" bIns="0">
+            <a:normAutofit/>
+          </a:bodyPr>
+          <a:p>
+            <a:endParaRPr b="0" lang="en-US" sz="2800" spc="-1" strike="noStrike">
               <a:solidFill>
                 <a:srgbClr val="000000"/>
               </a:solidFill>
@@ -711,14 +592,11 @@
       </p:sp>
     </p:spTree>
   </p:cSld>
-  <p:clrMapOvr>
-    <a:masterClrMapping/>
-  </p:clrMapOvr>
 </p:sldLayout>
 </file>
 
 <file path=ppt/slideLayouts/slideLayout2.xml><?xml version="1.0" encoding="utf-8"?>
-<p:sldLayout xmlns:a="http://schemas.openxmlformats.org/drawingml/2006/main" xmlns:r="http://schemas.openxmlformats.org/officeDocument/2006/relationships" xmlns:p="http://schemas.openxmlformats.org/presentationml/2006/main" type="tx" preserve="1">
+<p:sldLayout xmlns:a="http://schemas.openxmlformats.org/drawingml/2006/main" xmlns:p="http://schemas.openxmlformats.org/presentationml/2006/main" xmlns:r="http://schemas.openxmlformats.org/officeDocument/2006/relationships" xmlns:p14="http://schemas.microsoft.com/office/powerpoint/2010/main" xmlns:p15="http://schemas.microsoft.com/office/powerpoint/2012/main" xmlns:mc="http://schemas.openxmlformats.org/markup-compatibility/2006" type="tx" preserve="1">
   <p:cSld name="Title Slide">
     <p:spTree>
       <p:nvGrpSpPr>
@@ -754,12 +632,11 @@
           </a:prstGeom>
         </p:spPr>
         <p:txBody>
-          <a:bodyPr lIns="0" tIns="0" rIns="0" bIns="0" anchor="ctr">
+          <a:bodyPr lIns="0" rIns="0" tIns="0" bIns="0" anchor="ctr">
             <a:spAutoFit/>
           </a:bodyPr>
-          <a:lstStyle/>
-          <a:p>
-            <a:endParaRPr lang="en-US" sz="1800" b="0" strike="noStrike" spc="-1">
+          <a:p>
+            <a:endParaRPr b="0" lang="en-US" sz="1800" spc="-1" strike="noStrike">
               <a:solidFill>
                 <a:srgbClr val="000000"/>
               </a:solidFill>
@@ -788,13 +665,12 @@
           </a:prstGeom>
         </p:spPr>
         <p:txBody>
-          <a:bodyPr lIns="0" tIns="0" rIns="0" bIns="0" anchor="ctr">
+          <a:bodyPr lIns="0" rIns="0" tIns="0" bIns="0" anchor="ctr">
             <a:spAutoFit/>
           </a:bodyPr>
-          <a:lstStyle/>
           <a:p>
             <a:pPr algn="ctr"/>
-            <a:endParaRPr lang="en-US" sz="3200" b="0" strike="noStrike" spc="-1">
+            <a:endParaRPr b="0" lang="en-US" sz="3200" spc="-1" strike="noStrike">
               <a:latin typeface="Arial"/>
             </a:endParaRPr>
           </a:p>
@@ -802,14 +678,11 @@
       </p:sp>
     </p:spTree>
   </p:cSld>
-  <p:clrMapOvr>
-    <a:masterClrMapping/>
-  </p:clrMapOvr>
 </p:sldLayout>
 </file>
 
 <file path=ppt/slideLayouts/slideLayout3.xml><?xml version="1.0" encoding="utf-8"?>
-<p:sldLayout xmlns:a="http://schemas.openxmlformats.org/drawingml/2006/main" xmlns:r="http://schemas.openxmlformats.org/officeDocument/2006/relationships" xmlns:p="http://schemas.openxmlformats.org/presentationml/2006/main" type="obj" preserve="1">
+<p:sldLayout xmlns:a="http://schemas.openxmlformats.org/drawingml/2006/main" xmlns:p="http://schemas.openxmlformats.org/presentationml/2006/main" xmlns:r="http://schemas.openxmlformats.org/officeDocument/2006/relationships" xmlns:p14="http://schemas.microsoft.com/office/powerpoint/2010/main" xmlns:p15="http://schemas.microsoft.com/office/powerpoint/2012/main" xmlns:mc="http://schemas.openxmlformats.org/markup-compatibility/2006" type="obj" preserve="1">
   <p:cSld name="Title, Content">
     <p:spTree>
       <p:nvGrpSpPr>
@@ -845,12 +718,11 @@
           </a:prstGeom>
         </p:spPr>
         <p:txBody>
-          <a:bodyPr lIns="0" tIns="0" rIns="0" bIns="0" anchor="ctr">
+          <a:bodyPr lIns="0" rIns="0" tIns="0" bIns="0" anchor="ctr">
             <a:spAutoFit/>
           </a:bodyPr>
-          <a:lstStyle/>
-          <a:p>
-            <a:endParaRPr lang="en-US" sz="1800" b="0" strike="noStrike" spc="-1">
+          <a:p>
+            <a:endParaRPr b="0" lang="en-US" sz="1800" spc="-1" strike="noStrike">
               <a:solidFill>
                 <a:srgbClr val="000000"/>
               </a:solidFill>
@@ -879,12 +751,11 @@
           </a:prstGeom>
         </p:spPr>
         <p:txBody>
-          <a:bodyPr lIns="0" tIns="0" rIns="0" bIns="0">
-            <a:normAutofit/>
-          </a:bodyPr>
-          <a:lstStyle/>
-          <a:p>
-            <a:endParaRPr lang="en-US" sz="2800" b="0" strike="noStrike" spc="-1">
+          <a:bodyPr lIns="0" rIns="0" tIns="0" bIns="0">
+            <a:normAutofit/>
+          </a:bodyPr>
+          <a:p>
+            <a:endParaRPr b="0" lang="en-US" sz="2800" spc="-1" strike="noStrike">
               <a:solidFill>
                 <a:srgbClr val="000000"/>
               </a:solidFill>
@@ -895,14 +766,11 @@
       </p:sp>
     </p:spTree>
   </p:cSld>
-  <p:clrMapOvr>
-    <a:masterClrMapping/>
-  </p:clrMapOvr>
 </p:sldLayout>
 </file>
 
 <file path=ppt/slideLayouts/slideLayout4.xml><?xml version="1.0" encoding="utf-8"?>
-<p:sldLayout xmlns:a="http://schemas.openxmlformats.org/drawingml/2006/main" xmlns:r="http://schemas.openxmlformats.org/officeDocument/2006/relationships" xmlns:p="http://schemas.openxmlformats.org/presentationml/2006/main" type="twoObj" preserve="1">
+<p:sldLayout xmlns:a="http://schemas.openxmlformats.org/drawingml/2006/main" xmlns:p="http://schemas.openxmlformats.org/presentationml/2006/main" xmlns:r="http://schemas.openxmlformats.org/officeDocument/2006/relationships" xmlns:p14="http://schemas.microsoft.com/office/powerpoint/2010/main" xmlns:p15="http://schemas.microsoft.com/office/powerpoint/2012/main" xmlns:mc="http://schemas.openxmlformats.org/markup-compatibility/2006" type="twoObj" preserve="1">
   <p:cSld name="Title, 2 Content">
     <p:spTree>
       <p:nvGrpSpPr>
@@ -938,12 +806,11 @@
           </a:prstGeom>
         </p:spPr>
         <p:txBody>
-          <a:bodyPr lIns="0" tIns="0" rIns="0" bIns="0" anchor="ctr">
+          <a:bodyPr lIns="0" rIns="0" tIns="0" bIns="0" anchor="ctr">
             <a:spAutoFit/>
           </a:bodyPr>
-          <a:lstStyle/>
-          <a:p>
-            <a:endParaRPr lang="en-US" sz="1800" b="0" strike="noStrike" spc="-1">
+          <a:p>
+            <a:endParaRPr b="0" lang="en-US" sz="1800" spc="-1" strike="noStrike">
               <a:solidFill>
                 <a:srgbClr val="000000"/>
               </a:solidFill>
@@ -972,12 +839,11 @@
           </a:prstGeom>
         </p:spPr>
         <p:txBody>
-          <a:bodyPr lIns="0" tIns="0" rIns="0" bIns="0">
-            <a:normAutofit/>
-          </a:bodyPr>
-          <a:lstStyle/>
-          <a:p>
-            <a:endParaRPr lang="en-US" sz="2800" b="0" strike="noStrike" spc="-1">
+          <a:bodyPr lIns="0" rIns="0" tIns="0" bIns="0">
+            <a:normAutofit/>
+          </a:bodyPr>
+          <a:p>
+            <a:endParaRPr b="0" lang="en-US" sz="2800" spc="-1" strike="noStrike">
               <a:solidFill>
                 <a:srgbClr val="000000"/>
               </a:solidFill>
@@ -1006,12 +872,11 @@
           </a:prstGeom>
         </p:spPr>
         <p:txBody>
-          <a:bodyPr lIns="0" tIns="0" rIns="0" bIns="0">
-            <a:normAutofit/>
-          </a:bodyPr>
-          <a:lstStyle/>
-          <a:p>
-            <a:endParaRPr lang="en-US" sz="2800" b="0" strike="noStrike" spc="-1">
+          <a:bodyPr lIns="0" rIns="0" tIns="0" bIns="0">
+            <a:normAutofit/>
+          </a:bodyPr>
+          <a:p>
+            <a:endParaRPr b="0" lang="en-US" sz="2800" spc="-1" strike="noStrike">
               <a:solidFill>
                 <a:srgbClr val="000000"/>
               </a:solidFill>
@@ -1022,14 +887,11 @@
       </p:sp>
     </p:spTree>
   </p:cSld>
-  <p:clrMapOvr>
-    <a:masterClrMapping/>
-  </p:clrMapOvr>
 </p:sldLayout>
 </file>
 
 <file path=ppt/slideLayouts/slideLayout5.xml><?xml version="1.0" encoding="utf-8"?>
-<p:sldLayout xmlns:a="http://schemas.openxmlformats.org/drawingml/2006/main" xmlns:r="http://schemas.openxmlformats.org/officeDocument/2006/relationships" xmlns:p="http://schemas.openxmlformats.org/presentationml/2006/main" type="titleOnly" preserve="1">
+<p:sldLayout xmlns:a="http://schemas.openxmlformats.org/drawingml/2006/main" xmlns:p="http://schemas.openxmlformats.org/presentationml/2006/main" xmlns:r="http://schemas.openxmlformats.org/officeDocument/2006/relationships" xmlns:p14="http://schemas.microsoft.com/office/powerpoint/2010/main" xmlns:p15="http://schemas.microsoft.com/office/powerpoint/2012/main" xmlns:mc="http://schemas.openxmlformats.org/markup-compatibility/2006" type="titleOnly" preserve="1">
   <p:cSld name="Title Only">
     <p:spTree>
       <p:nvGrpSpPr>
@@ -1065,12 +927,11 @@
           </a:prstGeom>
         </p:spPr>
         <p:txBody>
-          <a:bodyPr lIns="0" tIns="0" rIns="0" bIns="0" anchor="ctr">
+          <a:bodyPr lIns="0" rIns="0" tIns="0" bIns="0" anchor="ctr">
             <a:spAutoFit/>
           </a:bodyPr>
-          <a:lstStyle/>
-          <a:p>
-            <a:endParaRPr lang="en-US" sz="1800" b="0" strike="noStrike" spc="-1">
+          <a:p>
+            <a:endParaRPr b="0" lang="en-US" sz="1800" spc="-1" strike="noStrike">
               <a:solidFill>
                 <a:srgbClr val="000000"/>
               </a:solidFill>
@@ -1081,14 +942,11 @@
       </p:sp>
     </p:spTree>
   </p:cSld>
-  <p:clrMapOvr>
-    <a:masterClrMapping/>
-  </p:clrMapOvr>
 </p:sldLayout>
 </file>
 
 <file path=ppt/slideLayouts/slideLayout6.xml><?xml version="1.0" encoding="utf-8"?>
-<p:sldLayout xmlns:a="http://schemas.openxmlformats.org/drawingml/2006/main" xmlns:r="http://schemas.openxmlformats.org/officeDocument/2006/relationships" xmlns:p="http://schemas.openxmlformats.org/presentationml/2006/main" type="objOnly" preserve="1">
+<p:sldLayout xmlns:a="http://schemas.openxmlformats.org/drawingml/2006/main" xmlns:p="http://schemas.openxmlformats.org/presentationml/2006/main" xmlns:r="http://schemas.openxmlformats.org/officeDocument/2006/relationships" xmlns:p14="http://schemas.microsoft.com/office/powerpoint/2010/main" xmlns:p15="http://schemas.microsoft.com/office/powerpoint/2012/main" xmlns:mc="http://schemas.openxmlformats.org/markup-compatibility/2006" type="objOnly" preserve="1">
   <p:cSld name="Centered Text">
     <p:spTree>
       <p:nvGrpSpPr>
@@ -1124,13 +982,12 @@
           </a:prstGeom>
         </p:spPr>
         <p:txBody>
-          <a:bodyPr lIns="0" tIns="0" rIns="0" bIns="0" anchor="ctr">
+          <a:bodyPr lIns="0" rIns="0" tIns="0" bIns="0" anchor="ctr">
             <a:spAutoFit/>
           </a:bodyPr>
-          <a:lstStyle/>
           <a:p>
             <a:pPr algn="ctr"/>
-            <a:endParaRPr lang="en-US" sz="3200" b="0" strike="noStrike" spc="-1">
+            <a:endParaRPr b="0" lang="en-US" sz="3200" spc="-1" strike="noStrike">
               <a:latin typeface="Arial"/>
             </a:endParaRPr>
           </a:p>
@@ -1138,14 +995,11 @@
       </p:sp>
     </p:spTree>
   </p:cSld>
-  <p:clrMapOvr>
-    <a:masterClrMapping/>
-  </p:clrMapOvr>
 </p:sldLayout>
 </file>
 
 <file path=ppt/slideLayouts/slideLayout7.xml><?xml version="1.0" encoding="utf-8"?>
-<p:sldLayout xmlns:a="http://schemas.openxmlformats.org/drawingml/2006/main" xmlns:r="http://schemas.openxmlformats.org/officeDocument/2006/relationships" xmlns:p="http://schemas.openxmlformats.org/presentationml/2006/main" type="twoObjAndObj" preserve="1">
+<p:sldLayout xmlns:a="http://schemas.openxmlformats.org/drawingml/2006/main" xmlns:p="http://schemas.openxmlformats.org/presentationml/2006/main" xmlns:r="http://schemas.openxmlformats.org/officeDocument/2006/relationships" xmlns:p14="http://schemas.microsoft.com/office/powerpoint/2010/main" xmlns:p15="http://schemas.microsoft.com/office/powerpoint/2012/main" xmlns:mc="http://schemas.openxmlformats.org/markup-compatibility/2006" type="twoObjAndObj" preserve="1">
   <p:cSld name="Title, 2 Content and Content">
     <p:spTree>
       <p:nvGrpSpPr>
@@ -1181,12 +1035,11 @@
           </a:prstGeom>
         </p:spPr>
         <p:txBody>
-          <a:bodyPr lIns="0" tIns="0" rIns="0" bIns="0" anchor="ctr">
+          <a:bodyPr lIns="0" rIns="0" tIns="0" bIns="0" anchor="ctr">
             <a:spAutoFit/>
           </a:bodyPr>
-          <a:lstStyle/>
-          <a:p>
-            <a:endParaRPr lang="en-US" sz="1800" b="0" strike="noStrike" spc="-1">
+          <a:p>
+            <a:endParaRPr b="0" lang="en-US" sz="1800" spc="-1" strike="noStrike">
               <a:solidFill>
                 <a:srgbClr val="000000"/>
               </a:solidFill>
@@ -1215,12 +1068,11 @@
           </a:prstGeom>
         </p:spPr>
         <p:txBody>
-          <a:bodyPr lIns="0" tIns="0" rIns="0" bIns="0">
-            <a:normAutofit/>
-          </a:bodyPr>
-          <a:lstStyle/>
-          <a:p>
-            <a:endParaRPr lang="en-US" sz="2800" b="0" strike="noStrike" spc="-1">
+          <a:bodyPr lIns="0" rIns="0" tIns="0" bIns="0">
+            <a:normAutofit/>
+          </a:bodyPr>
+          <a:p>
+            <a:endParaRPr b="0" lang="en-US" sz="2800" spc="-1" strike="noStrike">
               <a:solidFill>
                 <a:srgbClr val="000000"/>
               </a:solidFill>
@@ -1249,12 +1101,11 @@
           </a:prstGeom>
         </p:spPr>
         <p:txBody>
-          <a:bodyPr lIns="0" tIns="0" rIns="0" bIns="0">
-            <a:normAutofit/>
-          </a:bodyPr>
-          <a:lstStyle/>
-          <a:p>
-            <a:endParaRPr lang="en-US" sz="2800" b="0" strike="noStrike" spc="-1">
+          <a:bodyPr lIns="0" rIns="0" tIns="0" bIns="0">
+            <a:normAutofit/>
+          </a:bodyPr>
+          <a:p>
+            <a:endParaRPr b="0" lang="en-US" sz="2800" spc="-1" strike="noStrike">
               <a:solidFill>
                 <a:srgbClr val="000000"/>
               </a:solidFill>
@@ -1283,12 +1134,11 @@
           </a:prstGeom>
         </p:spPr>
         <p:txBody>
-          <a:bodyPr lIns="0" tIns="0" rIns="0" bIns="0">
-            <a:normAutofit/>
-          </a:bodyPr>
-          <a:lstStyle/>
-          <a:p>
-            <a:endParaRPr lang="en-US" sz="2800" b="0" strike="noStrike" spc="-1">
+          <a:bodyPr lIns="0" rIns="0" tIns="0" bIns="0">
+            <a:normAutofit/>
+          </a:bodyPr>
+          <a:p>
+            <a:endParaRPr b="0" lang="en-US" sz="2800" spc="-1" strike="noStrike">
               <a:solidFill>
                 <a:srgbClr val="000000"/>
               </a:solidFill>
@@ -1299,14 +1149,11 @@
       </p:sp>
     </p:spTree>
   </p:cSld>
-  <p:clrMapOvr>
-    <a:masterClrMapping/>
-  </p:clrMapOvr>
 </p:sldLayout>
 </file>
 
 <file path=ppt/slideLayouts/slideLayout8.xml><?xml version="1.0" encoding="utf-8"?>
-<p:sldLayout xmlns:a="http://schemas.openxmlformats.org/drawingml/2006/main" xmlns:r="http://schemas.openxmlformats.org/officeDocument/2006/relationships" xmlns:p="http://schemas.openxmlformats.org/presentationml/2006/main" type="objAndTwoObj" preserve="1">
+<p:sldLayout xmlns:a="http://schemas.openxmlformats.org/drawingml/2006/main" xmlns:p="http://schemas.openxmlformats.org/presentationml/2006/main" xmlns:r="http://schemas.openxmlformats.org/officeDocument/2006/relationships" xmlns:p14="http://schemas.microsoft.com/office/powerpoint/2010/main" xmlns:p15="http://schemas.microsoft.com/office/powerpoint/2012/main" xmlns:mc="http://schemas.openxmlformats.org/markup-compatibility/2006" type="objAndTwoObj" preserve="1">
   <p:cSld name="Title Content and 2 Content">
     <p:spTree>
       <p:nvGrpSpPr>
@@ -1342,12 +1189,11 @@
           </a:prstGeom>
         </p:spPr>
         <p:txBody>
-          <a:bodyPr lIns="0" tIns="0" rIns="0" bIns="0" anchor="ctr">
+          <a:bodyPr lIns="0" rIns="0" tIns="0" bIns="0" anchor="ctr">
             <a:spAutoFit/>
           </a:bodyPr>
-          <a:lstStyle/>
-          <a:p>
-            <a:endParaRPr lang="en-US" sz="1800" b="0" strike="noStrike" spc="-1">
+          <a:p>
+            <a:endParaRPr b="0" lang="en-US" sz="1800" spc="-1" strike="noStrike">
               <a:solidFill>
                 <a:srgbClr val="000000"/>
               </a:solidFill>
@@ -1376,12 +1222,11 @@
           </a:prstGeom>
         </p:spPr>
         <p:txBody>
-          <a:bodyPr lIns="0" tIns="0" rIns="0" bIns="0">
-            <a:normAutofit/>
-          </a:bodyPr>
-          <a:lstStyle/>
-          <a:p>
-            <a:endParaRPr lang="en-US" sz="2800" b="0" strike="noStrike" spc="-1">
+          <a:bodyPr lIns="0" rIns="0" tIns="0" bIns="0">
+            <a:normAutofit/>
+          </a:bodyPr>
+          <a:p>
+            <a:endParaRPr b="0" lang="en-US" sz="2800" spc="-1" strike="noStrike">
               <a:solidFill>
                 <a:srgbClr val="000000"/>
               </a:solidFill>
@@ -1410,12 +1255,11 @@
           </a:prstGeom>
         </p:spPr>
         <p:txBody>
-          <a:bodyPr lIns="0" tIns="0" rIns="0" bIns="0">
-            <a:normAutofit/>
-          </a:bodyPr>
-          <a:lstStyle/>
-          <a:p>
-            <a:endParaRPr lang="en-US" sz="2800" b="0" strike="noStrike" spc="-1">
+          <a:bodyPr lIns="0" rIns="0" tIns="0" bIns="0">
+            <a:normAutofit/>
+          </a:bodyPr>
+          <a:p>
+            <a:endParaRPr b="0" lang="en-US" sz="2800" spc="-1" strike="noStrike">
               <a:solidFill>
                 <a:srgbClr val="000000"/>
               </a:solidFill>
@@ -1444,12 +1288,11 @@
           </a:prstGeom>
         </p:spPr>
         <p:txBody>
-          <a:bodyPr lIns="0" tIns="0" rIns="0" bIns="0">
-            <a:normAutofit/>
-          </a:bodyPr>
-          <a:lstStyle/>
-          <a:p>
-            <a:endParaRPr lang="en-US" sz="2800" b="0" strike="noStrike" spc="-1">
+          <a:bodyPr lIns="0" rIns="0" tIns="0" bIns="0">
+            <a:normAutofit/>
+          </a:bodyPr>
+          <a:p>
+            <a:endParaRPr b="0" lang="en-US" sz="2800" spc="-1" strike="noStrike">
               <a:solidFill>
                 <a:srgbClr val="000000"/>
               </a:solidFill>
@@ -1460,14 +1303,11 @@
       </p:sp>
     </p:spTree>
   </p:cSld>
-  <p:clrMapOvr>
-    <a:masterClrMapping/>
-  </p:clrMapOvr>
 </p:sldLayout>
 </file>
 
 <file path=ppt/slideLayouts/slideLayout9.xml><?xml version="1.0" encoding="utf-8"?>
-<p:sldLayout xmlns:a="http://schemas.openxmlformats.org/drawingml/2006/main" xmlns:r="http://schemas.openxmlformats.org/officeDocument/2006/relationships" xmlns:p="http://schemas.openxmlformats.org/presentationml/2006/main" type="twoObjOverTx" preserve="1">
+<p:sldLayout xmlns:a="http://schemas.openxmlformats.org/drawingml/2006/main" xmlns:p="http://schemas.openxmlformats.org/presentationml/2006/main" xmlns:r="http://schemas.openxmlformats.org/officeDocument/2006/relationships" xmlns:p14="http://schemas.microsoft.com/office/powerpoint/2010/main" xmlns:p15="http://schemas.microsoft.com/office/powerpoint/2012/main" xmlns:mc="http://schemas.openxmlformats.org/markup-compatibility/2006" type="twoObjOverTx" preserve="1">
   <p:cSld name="Title, 2 Content over Content">
     <p:spTree>
       <p:nvGrpSpPr>
@@ -1503,12 +1343,11 @@
           </a:prstGeom>
         </p:spPr>
         <p:txBody>
-          <a:bodyPr lIns="0" tIns="0" rIns="0" bIns="0" anchor="ctr">
+          <a:bodyPr lIns="0" rIns="0" tIns="0" bIns="0" anchor="ctr">
             <a:spAutoFit/>
           </a:bodyPr>
-          <a:lstStyle/>
-          <a:p>
-            <a:endParaRPr lang="en-US" sz="1800" b="0" strike="noStrike" spc="-1">
+          <a:p>
+            <a:endParaRPr b="0" lang="en-US" sz="1800" spc="-1" strike="noStrike">
               <a:solidFill>
                 <a:srgbClr val="000000"/>
               </a:solidFill>
@@ -1537,12 +1376,11 @@
           </a:prstGeom>
         </p:spPr>
         <p:txBody>
-          <a:bodyPr lIns="0" tIns="0" rIns="0" bIns="0">
-            <a:normAutofit/>
-          </a:bodyPr>
-          <a:lstStyle/>
-          <a:p>
-            <a:endParaRPr lang="en-US" sz="2800" b="0" strike="noStrike" spc="-1">
+          <a:bodyPr lIns="0" rIns="0" tIns="0" bIns="0">
+            <a:normAutofit/>
+          </a:bodyPr>
+          <a:p>
+            <a:endParaRPr b="0" lang="en-US" sz="2800" spc="-1" strike="noStrike">
               <a:solidFill>
                 <a:srgbClr val="000000"/>
               </a:solidFill>
@@ -1571,12 +1409,11 @@
           </a:prstGeom>
         </p:spPr>
         <p:txBody>
-          <a:bodyPr lIns="0" tIns="0" rIns="0" bIns="0">
-            <a:normAutofit/>
-          </a:bodyPr>
-          <a:lstStyle/>
-          <a:p>
-            <a:endParaRPr lang="en-US" sz="2800" b="0" strike="noStrike" spc="-1">
+          <a:bodyPr lIns="0" rIns="0" tIns="0" bIns="0">
+            <a:normAutofit/>
+          </a:bodyPr>
+          <a:p>
+            <a:endParaRPr b="0" lang="en-US" sz="2800" spc="-1" strike="noStrike">
               <a:solidFill>
                 <a:srgbClr val="000000"/>
               </a:solidFill>
@@ -1605,12 +1442,11 @@
           </a:prstGeom>
         </p:spPr>
         <p:txBody>
-          <a:bodyPr lIns="0" tIns="0" rIns="0" bIns="0">
-            <a:normAutofit/>
-          </a:bodyPr>
-          <a:lstStyle/>
-          <a:p>
-            <a:endParaRPr lang="en-US" sz="2800" b="0" strike="noStrike" spc="-1">
+          <a:bodyPr lIns="0" rIns="0" tIns="0" bIns="0">
+            <a:normAutofit/>
+          </a:bodyPr>
+          <a:p>
+            <a:endParaRPr b="0" lang="en-US" sz="2800" spc="-1" strike="noStrike">
               <a:solidFill>
                 <a:srgbClr val="000000"/>
               </a:solidFill>
@@ -1621,21 +1457,17 @@
       </p:sp>
     </p:spTree>
   </p:cSld>
-  <p:clrMapOvr>
-    <a:masterClrMapping/>
-  </p:clrMapOvr>
 </p:sldLayout>
 </file>
 
 <file path=ppt/slideMasters/slideMaster1.xml><?xml version="1.0" encoding="utf-8"?>
-<p:sldMaster xmlns:a="http://schemas.openxmlformats.org/drawingml/2006/main" xmlns:r="http://schemas.openxmlformats.org/officeDocument/2006/relationships" xmlns:p="http://schemas.openxmlformats.org/presentationml/2006/main">
+<p:sldMaster xmlns:a="http://schemas.openxmlformats.org/drawingml/2006/main" xmlns:p="http://schemas.openxmlformats.org/presentationml/2006/main" xmlns:r="http://schemas.openxmlformats.org/officeDocument/2006/relationships" xmlns:p14="http://schemas.microsoft.com/office/powerpoint/2010/main" xmlns:p15="http://schemas.microsoft.com/office/powerpoint/2012/main" xmlns:mc="http://schemas.openxmlformats.org/markup-compatibility/2006">
   <p:cSld>
     <p:bg>
       <p:bgPr>
         <a:solidFill>
-          <a:srgbClr val="FFFFFF"/>
+          <a:srgbClr val="ffffff"/>
         </a:solidFill>
-        <a:effectLst/>
       </p:bgPr>
     </p:bg>
     <p:spTree>
@@ -1654,7 +1486,7 @@
       </p:grpSpPr>
       <p:sp>
         <p:nvSpPr>
-          <p:cNvPr id="4" name="PlaceHolder 1"/>
+          <p:cNvPr id="0" name="PlaceHolder 1"/>
           <p:cNvSpPr>
             <a:spLocks noGrp="1"/>
           </p:cNvSpPr>
@@ -1675,7 +1507,6 @@
           <a:bodyPr anchor="b">
             <a:noAutofit/>
           </a:bodyPr>
-          <a:lstStyle/>
           <a:p>
             <a:pPr algn="ctr">
               <a:lnSpc>
@@ -1683,7 +1514,7 @@
               </a:lnSpc>
             </a:pPr>
             <a:r>
-              <a:rPr lang="en-US" sz="6000" b="0" strike="noStrike" spc="-1">
+              <a:rPr b="0" lang="en-US" sz="6000" spc="-1" strike="noStrike">
                 <a:solidFill>
                   <a:srgbClr val="000000"/>
                 </a:solidFill>
@@ -1691,18 +1522,18 @@
               </a:rPr>
               <a:t>Образец заголовка</a:t>
             </a:r>
-            <a:endParaRPr lang="en-US" sz="6000" b="0" strike="noStrike" spc="-1">
-              <a:solidFill>
-                <a:srgbClr val="000000"/>
-              </a:solidFill>
-              <a:latin typeface="Calibri"/>
-            </a:endParaRPr>
-          </a:p>
-        </p:txBody>
-      </p:sp>
-      <p:sp>
-        <p:nvSpPr>
-          <p:cNvPr id="5" name="PlaceHolder 2"/>
+            <a:endParaRPr b="0" lang="en-US" sz="6000" spc="-1" strike="noStrike">
+              <a:solidFill>
+                <a:srgbClr val="000000"/>
+              </a:solidFill>
+              <a:latin typeface="Calibri"/>
+            </a:endParaRPr>
+          </a:p>
+        </p:txBody>
+      </p:sp>
+      <p:sp>
+        <p:nvSpPr>
+          <p:cNvPr id="1" name="PlaceHolder 2"/>
           <p:cNvSpPr>
             <a:spLocks noGrp="1"/>
           </p:cNvSpPr>
@@ -1723,7 +1554,6 @@
           <a:bodyPr anchor="ctr">
             <a:noAutofit/>
           </a:bodyPr>
-          <a:lstStyle/>
           <a:p>
             <a:pPr>
               <a:lnSpc>
@@ -1731,15 +1561,15 @@
               </a:lnSpc>
             </a:pPr>
             <a:fld id="{12315E9C-F235-4C86-9988-15B11479550A}" type="datetime">
-              <a:rPr lang="en-US" sz="1200" b="0" strike="noStrike" spc="-1">
+              <a:rPr b="0" lang="en-US" sz="1200" spc="-1" strike="noStrike">
                 <a:solidFill>
-                  <a:srgbClr val="8B8B8B"/>
+                  <a:srgbClr val="8b8b8b"/>
                 </a:solidFill>
                 <a:latin typeface="Calibri"/>
               </a:rPr>
-              <a:t>2/5/2020</a:t>
+              <a:t>8/6/19</a:t>
             </a:fld>
-            <a:endParaRPr lang="en-US" sz="1200" b="0" strike="noStrike" spc="-1">
+            <a:endParaRPr b="0" lang="en-US" sz="1200" spc="-1" strike="noStrike">
               <a:latin typeface="Times New Roman"/>
             </a:endParaRPr>
           </a:p>
@@ -1768,9 +1598,8 @@
           <a:bodyPr anchor="ctr">
             <a:noAutofit/>
           </a:bodyPr>
-          <a:lstStyle/>
-          <a:p>
-            <a:endParaRPr lang="en-US" sz="2400" b="0" strike="noStrike" spc="-1">
+          <a:p>
+            <a:endParaRPr b="0" lang="en-US" sz="2400" spc="-1" strike="noStrike">
               <a:latin typeface="Times New Roman"/>
             </a:endParaRPr>
           </a:p>
@@ -1799,7 +1628,6 @@
           <a:bodyPr anchor="ctr">
             <a:noAutofit/>
           </a:bodyPr>
-          <a:lstStyle/>
           <a:p>
             <a:pPr algn="r">
               <a:lnSpc>
@@ -1807,15 +1635,15 @@
               </a:lnSpc>
             </a:pPr>
             <a:fld id="{4C8574BB-D445-4AE9-918E-4B8E546A584D}" type="slidenum">
-              <a:rPr lang="en-US" sz="1200" b="0" strike="noStrike" spc="-1">
+              <a:rPr b="0" lang="en-US" sz="1200" spc="-1" strike="noStrike">
                 <a:solidFill>
-                  <a:srgbClr val="8B8B8B"/>
+                  <a:srgbClr val="8b8b8b"/>
                 </a:solidFill>
                 <a:latin typeface="Calibri"/>
               </a:rPr>
-              <a:t>‹#›</a:t>
+              <a:t>1</a:t>
             </a:fld>
-            <a:endParaRPr lang="en-US" sz="1200" b="0" strike="noStrike" spc="-1">
+            <a:endParaRPr b="0" lang="en-US" sz="1200" spc="-1" strike="noStrike">
               <a:latin typeface="Times New Roman"/>
             </a:endParaRPr>
           </a:p>
@@ -1823,306 +1651,26 @@
       </p:sp>
     </p:spTree>
   </p:cSld>
-  <p:clrMap bg1="lt1" tx1="dk1" bg2="lt2" tx2="dk2" accent1="accent1" accent2="accent2" accent3="accent3" accent4="accent4" accent5="accent5" accent6="accent6" hlink="hlink" folHlink="folHlink"/>
+  <p:clrMap bg1="lt1" bg2="lt2" tx1="dk1" tx2="dk2" accent1="accent1" accent2="accent2" accent3="accent3" accent4="accent4" accent5="accent5" accent6="accent6" hlink="hlink" folHlink="folHlink"/>
   <p:sldLayoutIdLst>
-    <p:sldLayoutId id="2147483649" r:id="rId1"/>
-    <p:sldLayoutId id="2147483650" r:id="rId2"/>
-    <p:sldLayoutId id="2147483651" r:id="rId3"/>
-    <p:sldLayoutId id="2147483652" r:id="rId4"/>
-    <p:sldLayoutId id="2147483653" r:id="rId5"/>
-    <p:sldLayoutId id="2147483654" r:id="rId6"/>
-    <p:sldLayoutId id="2147483655" r:id="rId7"/>
-    <p:sldLayoutId id="2147483656" r:id="rId8"/>
-    <p:sldLayoutId id="2147483657" r:id="rId9"/>
-    <p:sldLayoutId id="2147483658" r:id="rId10"/>
-    <p:sldLayoutId id="2147483659" r:id="rId11"/>
-    <p:sldLayoutId id="2147483660" r:id="rId12"/>
+    <p:sldLayoutId id="2147483649" r:id="rId2"/>
+    <p:sldLayoutId id="2147483650" r:id="rId3"/>
+    <p:sldLayoutId id="2147483651" r:id="rId4"/>
+    <p:sldLayoutId id="2147483652" r:id="rId5"/>
+    <p:sldLayoutId id="2147483653" r:id="rId6"/>
+    <p:sldLayoutId id="2147483654" r:id="rId7"/>
+    <p:sldLayoutId id="2147483655" r:id="rId8"/>
+    <p:sldLayoutId id="2147483656" r:id="rId9"/>
+    <p:sldLayoutId id="2147483657" r:id="rId10"/>
+    <p:sldLayoutId id="2147483658" r:id="rId11"/>
+    <p:sldLayoutId id="2147483659" r:id="rId12"/>
+    <p:sldLayoutId id="2147483660" r:id="rId13"/>
   </p:sldLayoutIdLst>
-  <p:txStyles>
-    <p:titleStyle>
-      <a:lvl1pPr algn="l" defTabSz="914400" rtl="0" eaLnBrk="1" latinLnBrk="0" hangingPunct="1">
-        <a:lnSpc>
-          <a:spcPct val="90000"/>
-        </a:lnSpc>
-        <a:spcBef>
-          <a:spcPct val="0"/>
-        </a:spcBef>
-        <a:buNone/>
-        <a:defRPr sz="4400" kern="1200">
-          <a:solidFill>
-            <a:schemeClr val="tx1"/>
-          </a:solidFill>
-          <a:latin typeface="+mj-lt"/>
-          <a:ea typeface="+mj-ea"/>
-          <a:cs typeface="+mj-cs"/>
-        </a:defRPr>
-      </a:lvl1pPr>
-    </p:titleStyle>
-    <p:bodyStyle>
-      <a:lvl1pPr marL="228600" indent="-228600" algn="l" defTabSz="914400" rtl="0" eaLnBrk="1" latinLnBrk="0" hangingPunct="1">
-        <a:lnSpc>
-          <a:spcPct val="90000"/>
-        </a:lnSpc>
-        <a:spcBef>
-          <a:spcPts val="1000"/>
-        </a:spcBef>
-        <a:buFont typeface="Arial" panose="020B0604020202020204" pitchFamily="34" charset="0"/>
-        <a:buChar char="•"/>
-        <a:defRPr sz="2800" kern="1200">
-          <a:solidFill>
-            <a:schemeClr val="tx1"/>
-          </a:solidFill>
-          <a:latin typeface="+mn-lt"/>
-          <a:ea typeface="+mn-ea"/>
-          <a:cs typeface="+mn-cs"/>
-        </a:defRPr>
-      </a:lvl1pPr>
-      <a:lvl2pPr marL="685800" indent="-228600" algn="l" defTabSz="914400" rtl="0" eaLnBrk="1" latinLnBrk="0" hangingPunct="1">
-        <a:lnSpc>
-          <a:spcPct val="90000"/>
-        </a:lnSpc>
-        <a:spcBef>
-          <a:spcPts val="500"/>
-        </a:spcBef>
-        <a:buFont typeface="Arial" panose="020B0604020202020204" pitchFamily="34" charset="0"/>
-        <a:buChar char="•"/>
-        <a:defRPr sz="2400" kern="1200">
-          <a:solidFill>
-            <a:schemeClr val="tx1"/>
-          </a:solidFill>
-          <a:latin typeface="+mn-lt"/>
-          <a:ea typeface="+mn-ea"/>
-          <a:cs typeface="+mn-cs"/>
-        </a:defRPr>
-      </a:lvl2pPr>
-      <a:lvl3pPr marL="1143000" indent="-228600" algn="l" defTabSz="914400" rtl="0" eaLnBrk="1" latinLnBrk="0" hangingPunct="1">
-        <a:lnSpc>
-          <a:spcPct val="90000"/>
-        </a:lnSpc>
-        <a:spcBef>
-          <a:spcPts val="500"/>
-        </a:spcBef>
-        <a:buFont typeface="Arial" panose="020B0604020202020204" pitchFamily="34" charset="0"/>
-        <a:buChar char="•"/>
-        <a:defRPr sz="2000" kern="1200">
-          <a:solidFill>
-            <a:schemeClr val="tx1"/>
-          </a:solidFill>
-          <a:latin typeface="+mn-lt"/>
-          <a:ea typeface="+mn-ea"/>
-          <a:cs typeface="+mn-cs"/>
-        </a:defRPr>
-      </a:lvl3pPr>
-      <a:lvl4pPr marL="1600200" indent="-228600" algn="l" defTabSz="914400" rtl="0" eaLnBrk="1" latinLnBrk="0" hangingPunct="1">
-        <a:lnSpc>
-          <a:spcPct val="90000"/>
-        </a:lnSpc>
-        <a:spcBef>
-          <a:spcPts val="500"/>
-        </a:spcBef>
-        <a:buFont typeface="Arial" panose="020B0604020202020204" pitchFamily="34" charset="0"/>
-        <a:buChar char="•"/>
-        <a:defRPr sz="1800" kern="1200">
-          <a:solidFill>
-            <a:schemeClr val="tx1"/>
-          </a:solidFill>
-          <a:latin typeface="+mn-lt"/>
-          <a:ea typeface="+mn-ea"/>
-          <a:cs typeface="+mn-cs"/>
-        </a:defRPr>
-      </a:lvl4pPr>
-      <a:lvl5pPr marL="2057400" indent="-228600" algn="l" defTabSz="914400" rtl="0" eaLnBrk="1" latinLnBrk="0" hangingPunct="1">
-        <a:lnSpc>
-          <a:spcPct val="90000"/>
-        </a:lnSpc>
-        <a:spcBef>
-          <a:spcPts val="500"/>
-        </a:spcBef>
-        <a:buFont typeface="Arial" panose="020B0604020202020204" pitchFamily="34" charset="0"/>
-        <a:buChar char="•"/>
-        <a:defRPr sz="1800" kern="1200">
-          <a:solidFill>
-            <a:schemeClr val="tx1"/>
-          </a:solidFill>
-          <a:latin typeface="+mn-lt"/>
-          <a:ea typeface="+mn-ea"/>
-          <a:cs typeface="+mn-cs"/>
-        </a:defRPr>
-      </a:lvl5pPr>
-      <a:lvl6pPr marL="2514600" indent="-228600" algn="l" defTabSz="914400" rtl="0" eaLnBrk="1" latinLnBrk="0" hangingPunct="1">
-        <a:lnSpc>
-          <a:spcPct val="90000"/>
-        </a:lnSpc>
-        <a:spcBef>
-          <a:spcPts val="500"/>
-        </a:spcBef>
-        <a:buFont typeface="Arial" panose="020B0604020202020204" pitchFamily="34" charset="0"/>
-        <a:buChar char="•"/>
-        <a:defRPr sz="1800" kern="1200">
-          <a:solidFill>
-            <a:schemeClr val="tx1"/>
-          </a:solidFill>
-          <a:latin typeface="+mn-lt"/>
-          <a:ea typeface="+mn-ea"/>
-          <a:cs typeface="+mn-cs"/>
-        </a:defRPr>
-      </a:lvl6pPr>
-      <a:lvl7pPr marL="2971800" indent="-228600" algn="l" defTabSz="914400" rtl="0" eaLnBrk="1" latinLnBrk="0" hangingPunct="1">
-        <a:lnSpc>
-          <a:spcPct val="90000"/>
-        </a:lnSpc>
-        <a:spcBef>
-          <a:spcPts val="500"/>
-        </a:spcBef>
-        <a:buFont typeface="Arial" panose="020B0604020202020204" pitchFamily="34" charset="0"/>
-        <a:buChar char="•"/>
-        <a:defRPr sz="1800" kern="1200">
-          <a:solidFill>
-            <a:schemeClr val="tx1"/>
-          </a:solidFill>
-          <a:latin typeface="+mn-lt"/>
-          <a:ea typeface="+mn-ea"/>
-          <a:cs typeface="+mn-cs"/>
-        </a:defRPr>
-      </a:lvl7pPr>
-      <a:lvl8pPr marL="3429000" indent="-228600" algn="l" defTabSz="914400" rtl="0" eaLnBrk="1" latinLnBrk="0" hangingPunct="1">
-        <a:lnSpc>
-          <a:spcPct val="90000"/>
-        </a:lnSpc>
-        <a:spcBef>
-          <a:spcPts val="500"/>
-        </a:spcBef>
-        <a:buFont typeface="Arial" panose="020B0604020202020204" pitchFamily="34" charset="0"/>
-        <a:buChar char="•"/>
-        <a:defRPr sz="1800" kern="1200">
-          <a:solidFill>
-            <a:schemeClr val="tx1"/>
-          </a:solidFill>
-          <a:latin typeface="+mn-lt"/>
-          <a:ea typeface="+mn-ea"/>
-          <a:cs typeface="+mn-cs"/>
-        </a:defRPr>
-      </a:lvl8pPr>
-      <a:lvl9pPr marL="3886200" indent="-228600" algn="l" defTabSz="914400" rtl="0" eaLnBrk="1" latinLnBrk="0" hangingPunct="1">
-        <a:lnSpc>
-          <a:spcPct val="90000"/>
-        </a:lnSpc>
-        <a:spcBef>
-          <a:spcPts val="500"/>
-        </a:spcBef>
-        <a:buFont typeface="Arial" panose="020B0604020202020204" pitchFamily="34" charset="0"/>
-        <a:buChar char="•"/>
-        <a:defRPr sz="1800" kern="1200">
-          <a:solidFill>
-            <a:schemeClr val="tx1"/>
-          </a:solidFill>
-          <a:latin typeface="+mn-lt"/>
-          <a:ea typeface="+mn-ea"/>
-          <a:cs typeface="+mn-cs"/>
-        </a:defRPr>
-      </a:lvl9pPr>
-    </p:bodyStyle>
-    <p:otherStyle>
-      <a:defPPr>
-        <a:defRPr lang="en-US"/>
-      </a:defPPr>
-      <a:lvl1pPr marL="0" algn="l" defTabSz="914400" rtl="0" eaLnBrk="1" latinLnBrk="0" hangingPunct="1">
-        <a:defRPr sz="1800" kern="1200">
-          <a:solidFill>
-            <a:schemeClr val="tx1"/>
-          </a:solidFill>
-          <a:latin typeface="+mn-lt"/>
-          <a:ea typeface="+mn-ea"/>
-          <a:cs typeface="+mn-cs"/>
-        </a:defRPr>
-      </a:lvl1pPr>
-      <a:lvl2pPr marL="457200" algn="l" defTabSz="914400" rtl="0" eaLnBrk="1" latinLnBrk="0" hangingPunct="1">
-        <a:defRPr sz="1800" kern="1200">
-          <a:solidFill>
-            <a:schemeClr val="tx1"/>
-          </a:solidFill>
-          <a:latin typeface="+mn-lt"/>
-          <a:ea typeface="+mn-ea"/>
-          <a:cs typeface="+mn-cs"/>
-        </a:defRPr>
-      </a:lvl2pPr>
-      <a:lvl3pPr marL="914400" algn="l" defTabSz="914400" rtl="0" eaLnBrk="1" latinLnBrk="0" hangingPunct="1">
-        <a:defRPr sz="1800" kern="1200">
-          <a:solidFill>
-            <a:schemeClr val="tx1"/>
-          </a:solidFill>
-          <a:latin typeface="+mn-lt"/>
-          <a:ea typeface="+mn-ea"/>
-          <a:cs typeface="+mn-cs"/>
-        </a:defRPr>
-      </a:lvl3pPr>
-      <a:lvl4pPr marL="1371600" algn="l" defTabSz="914400" rtl="0" eaLnBrk="1" latinLnBrk="0" hangingPunct="1">
-        <a:defRPr sz="1800" kern="1200">
-          <a:solidFill>
-            <a:schemeClr val="tx1"/>
-          </a:solidFill>
-          <a:latin typeface="+mn-lt"/>
-          <a:ea typeface="+mn-ea"/>
-          <a:cs typeface="+mn-cs"/>
-        </a:defRPr>
-      </a:lvl4pPr>
-      <a:lvl5pPr marL="1828800" algn="l" defTabSz="914400" rtl="0" eaLnBrk="1" latinLnBrk="0" hangingPunct="1">
-        <a:defRPr sz="1800" kern="1200">
-          <a:solidFill>
-            <a:schemeClr val="tx1"/>
-          </a:solidFill>
-          <a:latin typeface="+mn-lt"/>
-          <a:ea typeface="+mn-ea"/>
-          <a:cs typeface="+mn-cs"/>
-        </a:defRPr>
-      </a:lvl5pPr>
-      <a:lvl6pPr marL="2286000" algn="l" defTabSz="914400" rtl="0" eaLnBrk="1" latinLnBrk="0" hangingPunct="1">
-        <a:defRPr sz="1800" kern="1200">
-          <a:solidFill>
-            <a:schemeClr val="tx1"/>
-          </a:solidFill>
-          <a:latin typeface="+mn-lt"/>
-          <a:ea typeface="+mn-ea"/>
-          <a:cs typeface="+mn-cs"/>
-        </a:defRPr>
-      </a:lvl6pPr>
-      <a:lvl7pPr marL="2743200" algn="l" defTabSz="914400" rtl="0" eaLnBrk="1" latinLnBrk="0" hangingPunct="1">
-        <a:defRPr sz="1800" kern="1200">
-          <a:solidFill>
-            <a:schemeClr val="tx1"/>
-          </a:solidFill>
-          <a:latin typeface="+mn-lt"/>
-          <a:ea typeface="+mn-ea"/>
-          <a:cs typeface="+mn-cs"/>
-        </a:defRPr>
-      </a:lvl7pPr>
-      <a:lvl8pPr marL="3200400" algn="l" defTabSz="914400" rtl="0" eaLnBrk="1" latinLnBrk="0" hangingPunct="1">
-        <a:defRPr sz="1800" kern="1200">
-          <a:solidFill>
-            <a:schemeClr val="tx1"/>
-          </a:solidFill>
-          <a:latin typeface="+mn-lt"/>
-          <a:ea typeface="+mn-ea"/>
-          <a:cs typeface="+mn-cs"/>
-        </a:defRPr>
-      </a:lvl8pPr>
-      <a:lvl9pPr marL="3657600" algn="l" defTabSz="914400" rtl="0" eaLnBrk="1" latinLnBrk="0" hangingPunct="1">
-        <a:defRPr sz="1800" kern="1200">
-          <a:solidFill>
-            <a:schemeClr val="tx1"/>
-          </a:solidFill>
-          <a:latin typeface="+mn-lt"/>
-          <a:ea typeface="+mn-ea"/>
-          <a:cs typeface="+mn-cs"/>
-        </a:defRPr>
-      </a:lvl9pPr>
-    </p:otherStyle>
-  </p:txStyles>
 </p:sldMaster>
 </file>
 
 <file path=ppt/slides/slide1.xml><?xml version="1.0" encoding="utf-8"?>
-<p:sld xmlns:a="http://schemas.openxmlformats.org/drawingml/2006/main" xmlns:r="http://schemas.openxmlformats.org/officeDocument/2006/relationships" xmlns:p="http://schemas.openxmlformats.org/presentationml/2006/main">
+<p:sld xmlns:a="http://schemas.openxmlformats.org/drawingml/2006/main" xmlns:p="http://schemas.openxmlformats.org/presentationml/2006/main" xmlns:r="http://schemas.openxmlformats.org/officeDocument/2006/relationships" xmlns:p14="http://schemas.microsoft.com/office/powerpoint/2010/main" xmlns:p15="http://schemas.microsoft.com/office/powerpoint/2012/main" xmlns:mc="http://schemas.openxmlformats.org/markup-compatibility/2006">
   <p:cSld>
     <p:spTree>
       <p:nvGrpSpPr>
@@ -2161,7 +1709,6 @@
           <a:bodyPr anchor="b">
             <a:noAutofit/>
           </a:bodyPr>
-          <a:lstStyle/>
           <a:p>
             <a:pPr algn="ctr">
               <a:lnSpc>
@@ -2169,40 +1716,33 @@
               </a:lnSpc>
             </a:pPr>
             <a:r>
-              <a:rPr lang="en-US" sz="6000" b="0" strike="noStrike" spc="-1" dirty="0">
+              <a:rPr b="0" lang="en-US" sz="6000" spc="-1" strike="noStrike">
                 <a:solidFill>
                   <a:srgbClr val="000000"/>
                 </a:solidFill>
-                <a:latin typeface="Terminal Grotesque Open" panose="00000400000000000000" pitchFamily="50" charset="0"/>
+                <a:latin typeface="Beauty"/>
               </a:rPr>
-              <a:t>Terminal </a:t>
+              <a:t>Courier New font is used instead of missing Beauty font</a:t>
             </a:r>
-            <a:r>
-              <a:rPr lang="en-US" sz="6000" spc="-1" dirty="0">
-                <a:solidFill>
-                  <a:srgbClr val="000000"/>
-                </a:solidFill>
-                <a:latin typeface="Terminal Grotesque Open" panose="00000400000000000000" pitchFamily="50" charset="0"/>
-              </a:rPr>
-              <a:t>G</a:t>
-            </a:r>
-            <a:r>
-              <a:rPr lang="en-US" sz="6000" b="0" strike="noStrike" spc="-1" dirty="0">
-                <a:solidFill>
-                  <a:srgbClr val="000000"/>
-                </a:solidFill>
-                <a:latin typeface="Terminal Grotesque Open" panose="00000400000000000000" pitchFamily="50" charset="0"/>
-              </a:rPr>
-              <a:t>rotesque Open Font</a:t>
-            </a:r>
+            <a:endParaRPr b="0" lang="en-US" sz="6000" spc="-1" strike="noStrike">
+              <a:solidFill>
+                <a:srgbClr val="000000"/>
+              </a:solidFill>
+              <a:latin typeface="Calibri"/>
+            </a:endParaRPr>
           </a:p>
         </p:txBody>
       </p:sp>
     </p:spTree>
   </p:cSld>
-  <p:clrMapOvr>
-    <a:masterClrMapping/>
-  </p:clrMapOvr>
+  <mc:AlternateContent>
+    <mc:Choice Requires="p14">
+      <p:transition spd="slow" p14:dur="2000"/>
+    </mc:Choice>
+    <mc:Fallback>
+      <p:transition spd="slow"/>
+    </mc:Fallback>
+  </mc:AlternateContent>
   <p:timing>
     <p:tnLst>
       <p:par>
@@ -2211,14 +1751,14 @@
             <p:seq>
               <p:cTn id="2" dur="indefinite" nodeType="mainSeq"/>
               <p:prevCondLst>
-                <p:cond evt="onPrev" delay="0">
+                <p:cond delay="0" evt="onPrev">
                   <p:tgtEl>
                     <p:sldTgt/>
                   </p:tgtEl>
                 </p:cond>
               </p:prevCondLst>
               <p:nextCondLst>
-                <p:cond evt="onNext" delay="0">
+                <p:cond delay="0" evt="onNext">
                   <p:tgtEl>
                     <p:sldTgt/>
                   </p:tgtEl>
@@ -2244,34 +1784,34 @@
         <a:sysClr val="window" lastClr="FFFFFF"/>
       </a:lt1>
       <a:dk2>
-        <a:srgbClr val="44546A"/>
+        <a:srgbClr val="44546a"/>
       </a:dk2>
       <a:lt2>
-        <a:srgbClr val="E7E6E6"/>
+        <a:srgbClr val="e7e6e6"/>
       </a:lt2>
       <a:accent1>
-        <a:srgbClr val="5B9BD5"/>
+        <a:srgbClr val="5b9bd5"/>
       </a:accent1>
       <a:accent2>
-        <a:srgbClr val="ED7D31"/>
+        <a:srgbClr val="ed7d31"/>
       </a:accent2>
       <a:accent3>
-        <a:srgbClr val="A5A5A5"/>
+        <a:srgbClr val="a5a5a5"/>
       </a:accent3>
       <a:accent4>
-        <a:srgbClr val="FFC000"/>
+        <a:srgbClr val="ffc000"/>
       </a:accent4>
       <a:accent5>
-        <a:srgbClr val="4472C4"/>
+        <a:srgbClr val="4472c4"/>
       </a:accent5>
       <a:accent6>
-        <a:srgbClr val="70AD47"/>
+        <a:srgbClr val="70ad47"/>
       </a:accent6>
       <a:hlink>
-        <a:srgbClr val="0563C1"/>
+        <a:srgbClr val="0563c1"/>
       </a:hlink>
       <a:folHlink>
-        <a:srgbClr val="954F72"/>
+        <a:srgbClr val="954f72"/>
       </a:folHlink>
     </a:clrScheme>
     <a:fontScheme name="Office">
@@ -2453,7 +1993,5 @@
       </a:bgFillStyleLst>
     </a:fmtScheme>
   </a:themeElements>
-  <a:objectDefaults/>
-  <a:extraClrSchemeLst/>
 </a:theme>
 </file>
</xml_diff>